<commit_message>
Add directive to init code-blocks
Created a new component for operators
</commit_message>
<xml_diff>
--- a/Reactive Programming.pptx
+++ b/Reactive Programming.pptx
@@ -273,7 +273,7 @@
           <a:p>
             <a:fld id="{75934EED-E7C0-439C-9F42-70CEC4ABC1D3}" type="datetimeFigureOut">
               <a:rPr lang="nl-NL" smtClean="0"/>
-              <a:t>26-4-2020</a:t>
+              <a:t>28-4-2020</a:t>
             </a:fld>
             <a:endParaRPr lang="nl-NL"/>
           </a:p>
@@ -473,7 +473,7 @@
           <a:p>
             <a:fld id="{75934EED-E7C0-439C-9F42-70CEC4ABC1D3}" type="datetimeFigureOut">
               <a:rPr lang="nl-NL" smtClean="0"/>
-              <a:t>26-4-2020</a:t>
+              <a:t>28-4-2020</a:t>
             </a:fld>
             <a:endParaRPr lang="nl-NL"/>
           </a:p>
@@ -683,7 +683,7 @@
           <a:p>
             <a:fld id="{75934EED-E7C0-439C-9F42-70CEC4ABC1D3}" type="datetimeFigureOut">
               <a:rPr lang="nl-NL" smtClean="0"/>
-              <a:t>26-4-2020</a:t>
+              <a:t>28-4-2020</a:t>
             </a:fld>
             <a:endParaRPr lang="nl-NL"/>
           </a:p>
@@ -883,7 +883,7 @@
           <a:p>
             <a:fld id="{75934EED-E7C0-439C-9F42-70CEC4ABC1D3}" type="datetimeFigureOut">
               <a:rPr lang="nl-NL" smtClean="0"/>
-              <a:t>26-4-2020</a:t>
+              <a:t>28-4-2020</a:t>
             </a:fld>
             <a:endParaRPr lang="nl-NL"/>
           </a:p>
@@ -1159,7 +1159,7 @@
           <a:p>
             <a:fld id="{75934EED-E7C0-439C-9F42-70CEC4ABC1D3}" type="datetimeFigureOut">
               <a:rPr lang="nl-NL" smtClean="0"/>
-              <a:t>26-4-2020</a:t>
+              <a:t>28-4-2020</a:t>
             </a:fld>
             <a:endParaRPr lang="nl-NL"/>
           </a:p>
@@ -1427,7 +1427,7 @@
           <a:p>
             <a:fld id="{75934EED-E7C0-439C-9F42-70CEC4ABC1D3}" type="datetimeFigureOut">
               <a:rPr lang="nl-NL" smtClean="0"/>
-              <a:t>26-4-2020</a:t>
+              <a:t>28-4-2020</a:t>
             </a:fld>
             <a:endParaRPr lang="nl-NL"/>
           </a:p>
@@ -1842,7 +1842,7 @@
           <a:p>
             <a:fld id="{75934EED-E7C0-439C-9F42-70CEC4ABC1D3}" type="datetimeFigureOut">
               <a:rPr lang="nl-NL" smtClean="0"/>
-              <a:t>26-4-2020</a:t>
+              <a:t>28-4-2020</a:t>
             </a:fld>
             <a:endParaRPr lang="nl-NL"/>
           </a:p>
@@ -1984,7 +1984,7 @@
           <a:p>
             <a:fld id="{75934EED-E7C0-439C-9F42-70CEC4ABC1D3}" type="datetimeFigureOut">
               <a:rPr lang="nl-NL" smtClean="0"/>
-              <a:t>26-4-2020</a:t>
+              <a:t>28-4-2020</a:t>
             </a:fld>
             <a:endParaRPr lang="nl-NL"/>
           </a:p>
@@ -2097,7 +2097,7 @@
           <a:p>
             <a:fld id="{75934EED-E7C0-439C-9F42-70CEC4ABC1D3}" type="datetimeFigureOut">
               <a:rPr lang="nl-NL" smtClean="0"/>
-              <a:t>26-4-2020</a:t>
+              <a:t>28-4-2020</a:t>
             </a:fld>
             <a:endParaRPr lang="nl-NL"/>
           </a:p>
@@ -2410,7 +2410,7 @@
           <a:p>
             <a:fld id="{75934EED-E7C0-439C-9F42-70CEC4ABC1D3}" type="datetimeFigureOut">
               <a:rPr lang="nl-NL" smtClean="0"/>
-              <a:t>26-4-2020</a:t>
+              <a:t>28-4-2020</a:t>
             </a:fld>
             <a:endParaRPr lang="nl-NL"/>
           </a:p>
@@ -2699,7 +2699,7 @@
           <a:p>
             <a:fld id="{75934EED-E7C0-439C-9F42-70CEC4ABC1D3}" type="datetimeFigureOut">
               <a:rPr lang="nl-NL" smtClean="0"/>
-              <a:t>26-4-2020</a:t>
+              <a:t>28-4-2020</a:t>
             </a:fld>
             <a:endParaRPr lang="nl-NL"/>
           </a:p>
@@ -2942,7 +2942,7 @@
           <a:p>
             <a:fld id="{75934EED-E7C0-439C-9F42-70CEC4ABC1D3}" type="datetimeFigureOut">
               <a:rPr lang="nl-NL" smtClean="0"/>
-              <a:t>26-4-2020</a:t>
+              <a:t>28-4-2020</a:t>
             </a:fld>
             <a:endParaRPr lang="nl-NL"/>
           </a:p>
@@ -3605,7 +3605,7 @@
             </a:r>
             <a:r>
               <a:rPr lang="en-US" dirty="0"/>
-              <a:t> – Conditional operators</a:t>
+              <a:t> – Combinational operators</a:t>
             </a:r>
             <a:endParaRPr lang="nl-NL" dirty="0"/>
           </a:p>

</xml_diff>

<commit_message>
Added the final set of operator demos's
Code is not yet final.
</commit_message>
<xml_diff>
--- a/Reactive Programming.pptx
+++ b/Reactive Programming.pptx
@@ -273,7 +273,7 @@
           <a:p>
             <a:fld id="{75934EED-E7C0-439C-9F42-70CEC4ABC1D3}" type="datetimeFigureOut">
               <a:rPr lang="nl-NL" smtClean="0"/>
-              <a:t>28-4-2020</a:t>
+              <a:t>29-4-2020</a:t>
             </a:fld>
             <a:endParaRPr lang="nl-NL"/>
           </a:p>
@@ -473,7 +473,7 @@
           <a:p>
             <a:fld id="{75934EED-E7C0-439C-9F42-70CEC4ABC1D3}" type="datetimeFigureOut">
               <a:rPr lang="nl-NL" smtClean="0"/>
-              <a:t>28-4-2020</a:t>
+              <a:t>29-4-2020</a:t>
             </a:fld>
             <a:endParaRPr lang="nl-NL"/>
           </a:p>
@@ -683,7 +683,7 @@
           <a:p>
             <a:fld id="{75934EED-E7C0-439C-9F42-70CEC4ABC1D3}" type="datetimeFigureOut">
               <a:rPr lang="nl-NL" smtClean="0"/>
-              <a:t>28-4-2020</a:t>
+              <a:t>29-4-2020</a:t>
             </a:fld>
             <a:endParaRPr lang="nl-NL"/>
           </a:p>
@@ -883,7 +883,7 @@
           <a:p>
             <a:fld id="{75934EED-E7C0-439C-9F42-70CEC4ABC1D3}" type="datetimeFigureOut">
               <a:rPr lang="nl-NL" smtClean="0"/>
-              <a:t>28-4-2020</a:t>
+              <a:t>29-4-2020</a:t>
             </a:fld>
             <a:endParaRPr lang="nl-NL"/>
           </a:p>
@@ -1159,7 +1159,7 @@
           <a:p>
             <a:fld id="{75934EED-E7C0-439C-9F42-70CEC4ABC1D3}" type="datetimeFigureOut">
               <a:rPr lang="nl-NL" smtClean="0"/>
-              <a:t>28-4-2020</a:t>
+              <a:t>29-4-2020</a:t>
             </a:fld>
             <a:endParaRPr lang="nl-NL"/>
           </a:p>
@@ -1427,7 +1427,7 @@
           <a:p>
             <a:fld id="{75934EED-E7C0-439C-9F42-70CEC4ABC1D3}" type="datetimeFigureOut">
               <a:rPr lang="nl-NL" smtClean="0"/>
-              <a:t>28-4-2020</a:t>
+              <a:t>29-4-2020</a:t>
             </a:fld>
             <a:endParaRPr lang="nl-NL"/>
           </a:p>
@@ -1842,7 +1842,7 @@
           <a:p>
             <a:fld id="{75934EED-E7C0-439C-9F42-70CEC4ABC1D3}" type="datetimeFigureOut">
               <a:rPr lang="nl-NL" smtClean="0"/>
-              <a:t>28-4-2020</a:t>
+              <a:t>29-4-2020</a:t>
             </a:fld>
             <a:endParaRPr lang="nl-NL"/>
           </a:p>
@@ -1984,7 +1984,7 @@
           <a:p>
             <a:fld id="{75934EED-E7C0-439C-9F42-70CEC4ABC1D3}" type="datetimeFigureOut">
               <a:rPr lang="nl-NL" smtClean="0"/>
-              <a:t>28-4-2020</a:t>
+              <a:t>29-4-2020</a:t>
             </a:fld>
             <a:endParaRPr lang="nl-NL"/>
           </a:p>
@@ -2097,7 +2097,7 @@
           <a:p>
             <a:fld id="{75934EED-E7C0-439C-9F42-70CEC4ABC1D3}" type="datetimeFigureOut">
               <a:rPr lang="nl-NL" smtClean="0"/>
-              <a:t>28-4-2020</a:t>
+              <a:t>29-4-2020</a:t>
             </a:fld>
             <a:endParaRPr lang="nl-NL"/>
           </a:p>
@@ -2410,7 +2410,7 @@
           <a:p>
             <a:fld id="{75934EED-E7C0-439C-9F42-70CEC4ABC1D3}" type="datetimeFigureOut">
               <a:rPr lang="nl-NL" smtClean="0"/>
-              <a:t>28-4-2020</a:t>
+              <a:t>29-4-2020</a:t>
             </a:fld>
             <a:endParaRPr lang="nl-NL"/>
           </a:p>
@@ -2699,7 +2699,7 @@
           <a:p>
             <a:fld id="{75934EED-E7C0-439C-9F42-70CEC4ABC1D3}" type="datetimeFigureOut">
               <a:rPr lang="nl-NL" smtClean="0"/>
-              <a:t>28-4-2020</a:t>
+              <a:t>29-4-2020</a:t>
             </a:fld>
             <a:endParaRPr lang="nl-NL"/>
           </a:p>
@@ -2942,7 +2942,7 @@
           <a:p>
             <a:fld id="{75934EED-E7C0-439C-9F42-70CEC4ABC1D3}" type="datetimeFigureOut">
               <a:rPr lang="nl-NL" smtClean="0"/>
-              <a:t>28-4-2020</a:t>
+              <a:t>29-4-2020</a:t>
             </a:fld>
             <a:endParaRPr lang="nl-NL"/>
           </a:p>
@@ -3764,18 +3764,9 @@
           <a:p>
             <a:pPr lvl="1"/>
             <a:r>
-              <a:rPr lang="en-US" dirty="0"/>
+              <a:rPr lang="en-US"/>
               <a:t>Of</a:t>
             </a:r>
-          </a:p>
-          <a:p>
-            <a:pPr lvl="1"/>
-            <a:r>
-              <a:rPr lang="en-US" dirty="0"/>
-              <a:t>Timer</a:t>
-            </a:r>
-          </a:p>
-          <a:p>
             <a:endParaRPr lang="nl-NL" dirty="0"/>
           </a:p>
         </p:txBody>
@@ -4193,7 +4184,7 @@
         <p:spPr/>
         <p:txBody>
           <a:bodyPr>
-            <a:normAutofit/>
+            <a:normAutofit lnSpcReduction="10000"/>
           </a:bodyPr>
           <a:lstStyle/>
           <a:p>
@@ -4230,6 +4221,15 @@
           </a:p>
           <a:p>
             <a:r>
+              <a:rPr lang="en-US" b="1" dirty="0"/>
+              <a:t>Why use ‘Reactive programming’?</a:t>
+            </a:r>
+          </a:p>
+          <a:p>
+            <a:endParaRPr lang="en-US" i="1" dirty="0"/>
+          </a:p>
+          <a:p>
+            <a:r>
               <a:rPr lang="en-US" dirty="0"/>
               <a:t>Key aspects:</a:t>
             </a:r>
@@ -4247,6 +4247,14 @@
               <a:rPr lang="en-US" dirty="0"/>
               <a:t>Asynchronous</a:t>
             </a:r>
+          </a:p>
+          <a:p>
+            <a:pPr lvl="1"/>
+            <a:endParaRPr lang="en-US" dirty="0"/>
+          </a:p>
+          <a:p>
+            <a:pPr lvl="1"/>
+            <a:endParaRPr lang="en-US" dirty="0"/>
           </a:p>
           <a:p>
             <a:endParaRPr lang="en-US" i="1" dirty="0"/>
@@ -4456,6 +4464,15 @@
         <p:txBody>
           <a:bodyPr/>
           <a:lstStyle/>
+          <a:p>
+            <a:r>
+              <a:rPr lang="en-US" dirty="0"/>
+              <a:t>Library for multiple languages</a:t>
+            </a:r>
+          </a:p>
+          <a:p>
+            <a:endParaRPr lang="en-US" dirty="0"/>
+          </a:p>
           <a:p>
             <a:r>
               <a:rPr lang="en-US" dirty="0"/>

</xml_diff>